<commit_message>
ppt update, mobile responsive
</commit_message>
<xml_diff>
--- a/whoDisHere.pptx
+++ b/whoDisHere.pptx
@@ -3608,7 +3608,7 @@
             <a:pPr fontAlgn="base"/>
             <a:r>
               <a:rPr lang="en-US" dirty="0"/>
-              <a:t>User story</a:t>
+              <a:t>User story: As a new developer, I want an app which can be used to help “break the ice”, so that I can get to know my fellow developers better.</a:t>
             </a:r>
           </a:p>
           <a:p>
@@ -3702,10 +3702,84 @@
             </a:r>
           </a:p>
           <a:p>
+            <a:pPr lvl="1" fontAlgn="base"/>
+            <a:r>
+              <a:rPr lang="en-US" dirty="0" err="1"/>
+              <a:t>passport.js</a:t>
+            </a:r>
+            <a:endParaRPr lang="en-US" dirty="0"/>
+          </a:p>
+          <a:p>
+            <a:pPr lvl="1" fontAlgn="base"/>
+            <a:r>
+              <a:rPr lang="en-US" dirty="0"/>
+              <a:t>express</a:t>
+            </a:r>
+          </a:p>
+          <a:p>
+            <a:pPr lvl="1" fontAlgn="base"/>
+            <a:r>
+              <a:rPr lang="en-US" dirty="0"/>
+              <a:t>handlebars</a:t>
+            </a:r>
+          </a:p>
+          <a:p>
+            <a:pPr lvl="1" fontAlgn="base"/>
+            <a:r>
+              <a:rPr lang="en-US" dirty="0" err="1"/>
+              <a:t>Sequelize</a:t>
+            </a:r>
+            <a:r>
+              <a:rPr lang="en-US" dirty="0"/>
+              <a:t> </a:t>
+            </a:r>
+          </a:p>
+          <a:p>
+            <a:pPr lvl="1" fontAlgn="base"/>
+            <a:endParaRPr lang="en-US" dirty="0"/>
+          </a:p>
+          <a:p>
             <a:pPr fontAlgn="base"/>
             <a:r>
               <a:rPr lang="en-US" dirty="0"/>
               <a:t>Breakdown of tasks and roles</a:t>
+            </a:r>
+          </a:p>
+          <a:p>
+            <a:pPr lvl="1" fontAlgn="base"/>
+            <a:r>
+              <a:rPr lang="en-US" dirty="0" err="1"/>
+              <a:t>Analee</a:t>
+            </a:r>
+            <a:r>
+              <a:rPr lang="en-US" dirty="0"/>
+              <a:t> – routes, </a:t>
+            </a:r>
+            <a:r>
+              <a:rPr lang="en-US" dirty="0" err="1"/>
+              <a:t>passport.js</a:t>
+            </a:r>
+            <a:endParaRPr lang="en-US" dirty="0"/>
+          </a:p>
+          <a:p>
+            <a:pPr lvl="1" fontAlgn="base"/>
+            <a:r>
+              <a:rPr lang="en-US" dirty="0"/>
+              <a:t>Keita – models, PowerPoint</a:t>
+            </a:r>
+          </a:p>
+          <a:p>
+            <a:pPr lvl="1" fontAlgn="base"/>
+            <a:r>
+              <a:rPr lang="en-US" dirty="0"/>
+              <a:t>Kevin – routes, html, </a:t>
+            </a:r>
+          </a:p>
+          <a:p>
+            <a:pPr lvl="1" fontAlgn="base"/>
+            <a:r>
+              <a:rPr lang="en-US" dirty="0"/>
+              <a:t>Laura – models, CSS</a:t>
             </a:r>
           </a:p>
           <a:p>
@@ -3803,7 +3877,10 @@
           <a:bodyPr/>
           <a:lstStyle/>
           <a:p>
-            <a:endParaRPr lang="en-US"/>
+            <a:r>
+              <a:rPr lang="en-US" dirty="0"/>
+              <a:t>Demo video here</a:t>
+            </a:r>
           </a:p>
         </p:txBody>
       </p:sp>
@@ -3886,7 +3963,28 @@
           <a:bodyPr/>
           <a:lstStyle/>
           <a:p>
-            <a:endParaRPr lang="en-US"/>
+            <a:r>
+              <a:rPr lang="en-US" dirty="0"/>
+              <a:t>Have user to create questions</a:t>
+            </a:r>
+          </a:p>
+          <a:p>
+            <a:r>
+              <a:rPr lang="en-US" dirty="0"/>
+              <a:t>Expand answer variety</a:t>
+            </a:r>
+          </a:p>
+          <a:p>
+            <a:r>
+              <a:rPr lang="en-US" dirty="0"/>
+              <a:t>Create a game to guess who is the developer based on the answers provided</a:t>
+            </a:r>
+          </a:p>
+          <a:p>
+            <a:r>
+              <a:rPr lang="en-US" dirty="0"/>
+              <a:t>Track score</a:t>
+            </a:r>
           </a:p>
         </p:txBody>
       </p:sp>
@@ -3978,7 +4076,7 @@
           <a:p>
             <a:pPr fontAlgn="base"/>
             <a:r>
-              <a:rPr lang="en-US"/>
+              <a:rPr lang="en-US" dirty="0"/>
               <a:t>GitHub repo</a:t>
             </a:r>
           </a:p>

</xml_diff>

<commit_message>
fix on buttons, update on ppt
</commit_message>
<xml_diff>
--- a/whoDisHere.pptx
+++ b/whoDisHere.pptx
@@ -9,9 +9,10 @@
     <p:sldId id="257" r:id="rId3"/>
     <p:sldId id="258" r:id="rId4"/>
     <p:sldId id="259" r:id="rId5"/>
-    <p:sldId id="260" r:id="rId6"/>
-    <p:sldId id="261" r:id="rId7"/>
-    <p:sldId id="262" r:id="rId8"/>
+    <p:sldId id="263" r:id="rId6"/>
+    <p:sldId id="260" r:id="rId7"/>
+    <p:sldId id="261" r:id="rId8"/>
+    <p:sldId id="262" r:id="rId9"/>
   </p:sldIdLst>
   <p:sldSz cx="12192000" cy="6858000"/>
   <p:notesSz cx="6858000" cy="9144000"/>
@@ -3603,21 +3604,28 @@
             <a:pPr fontAlgn="base"/>
             <a:r>
               <a:rPr lang="en-US" dirty="0"/>
-              <a:t>Description</a:t>
-            </a:r>
-          </a:p>
-          <a:p>
-            <a:pPr fontAlgn="base"/>
-            <a:r>
-              <a:rPr lang="en-US" dirty="0"/>
-              <a:t>Motivation for development?</a:t>
-            </a:r>
-          </a:p>
-          <a:p>
-            <a:pPr fontAlgn="base"/>
-            <a:r>
-              <a:rPr lang="en-US" dirty="0"/>
-              <a:t>User story: As a new developer, I want an app which can be used to help “break the ice”, so that I can get to know my fellow developers better.</a:t>
+              <a:t>User story: </a:t>
+            </a:r>
+          </a:p>
+          <a:p>
+            <a:pPr lvl="1" fontAlgn="base"/>
+            <a:r>
+              <a:rPr lang="en-US" dirty="0"/>
+              <a:t>As a new developer, </a:t>
+            </a:r>
+          </a:p>
+          <a:p>
+            <a:pPr lvl="1" fontAlgn="base"/>
+            <a:r>
+              <a:rPr lang="en-US" dirty="0"/>
+              <a:t>I want an app which can be used to help “break the ice”, </a:t>
+            </a:r>
+          </a:p>
+          <a:p>
+            <a:pPr lvl="1" fontAlgn="base"/>
+            <a:r>
+              <a:rPr lang="en-US" dirty="0"/>
+              <a:t>so that I can get to know my fellow developers better.</a:t>
             </a:r>
           </a:p>
           <a:p>
@@ -3798,20 +3806,6 @@
               <a:t>Laura – models, CSS</a:t>
             </a:r>
           </a:p>
-          <a:p>
-            <a:pPr fontAlgn="base"/>
-            <a:r>
-              <a:rPr lang="en-US" dirty="0"/>
-              <a:t>Challenges</a:t>
-            </a:r>
-          </a:p>
-          <a:p>
-            <a:pPr fontAlgn="base"/>
-            <a:r>
-              <a:rPr lang="en-US" dirty="0"/>
-              <a:t>Successes</a:t>
-            </a:r>
-          </a:p>
         </p:txBody>
       </p:sp>
     </p:spTree>
@@ -3849,7 +3843,7 @@
           <p:cNvPr id="2" name="Title 1">
             <a:extLst>
               <a:ext uri="{FF2B5EF4-FFF2-40B4-BE49-F238E27FC236}">
-                <a16:creationId xmlns:a16="http://schemas.microsoft.com/office/drawing/2014/main" id="{2F9C1AF3-2894-A044-8E34-0A7436DD051E}"/>
+                <a16:creationId xmlns:a16="http://schemas.microsoft.com/office/drawing/2014/main" id="{6D232FA0-72CB-4342-8565-5EE5DDF0FEB0}"/>
               </a:ext>
             </a:extLst>
           </p:cNvPr>
@@ -3867,7 +3861,7 @@
           <a:p>
             <a:r>
               <a:rPr lang="en-US" dirty="0"/>
-              <a:t>Demo</a:t>
+              <a:t>Process</a:t>
             </a:r>
           </a:p>
         </p:txBody>
@@ -3877,7 +3871,7 @@
           <p:cNvPr id="3" name="Content Placeholder 2">
             <a:extLst>
               <a:ext uri="{FF2B5EF4-FFF2-40B4-BE49-F238E27FC236}">
-                <a16:creationId xmlns:a16="http://schemas.microsoft.com/office/drawing/2014/main" id="{A6BF465F-C290-DF40-A267-E45C6A9EAC84}"/>
+                <a16:creationId xmlns:a16="http://schemas.microsoft.com/office/drawing/2014/main" id="{D51710B8-6F4D-0F42-88BF-9829F4594B96}"/>
               </a:ext>
             </a:extLst>
           </p:cNvPr>
@@ -3893,9 +3887,24 @@
           <a:bodyPr/>
           <a:lstStyle/>
           <a:p>
-            <a:r>
-              <a:rPr lang="en-US" dirty="0"/>
-              <a:t>Demo video here</a:t>
+            <a:pPr fontAlgn="base"/>
+            <a:r>
+              <a:rPr lang="en-US" dirty="0"/>
+              <a:t>Challenges</a:t>
+            </a:r>
+          </a:p>
+          <a:p>
+            <a:pPr lvl="1" fontAlgn="base"/>
+            <a:r>
+              <a:rPr lang="en-US" dirty="0"/>
+              <a:t>Posting users’ answers by each question</a:t>
+            </a:r>
+          </a:p>
+          <a:p>
+            <a:pPr fontAlgn="base"/>
+            <a:r>
+              <a:rPr lang="en-US" dirty="0"/>
+              <a:t>Successes</a:t>
             </a:r>
           </a:p>
         </p:txBody>
@@ -3903,7 +3912,7 @@
     </p:spTree>
     <p:extLst>
       <p:ext uri="{BB962C8B-B14F-4D97-AF65-F5344CB8AC3E}">
-        <p14:creationId xmlns:p14="http://schemas.microsoft.com/office/powerpoint/2010/main" val="3947207254"/>
+        <p14:creationId xmlns:p14="http://schemas.microsoft.com/office/powerpoint/2010/main" val="2394218091"/>
       </p:ext>
     </p:extLst>
   </p:cSld>
@@ -3935,7 +3944,7 @@
           <p:cNvPr id="2" name="Title 1">
             <a:extLst>
               <a:ext uri="{FF2B5EF4-FFF2-40B4-BE49-F238E27FC236}">
-                <a16:creationId xmlns:a16="http://schemas.microsoft.com/office/drawing/2014/main" id="{8A1BF9CB-7A7D-EE42-AC8A-80C2AAD7ABBF}"/>
+                <a16:creationId xmlns:a16="http://schemas.microsoft.com/office/drawing/2014/main" id="{2F9C1AF3-2894-A044-8E34-0A7436DD051E}"/>
               </a:ext>
             </a:extLst>
           </p:cNvPr>
@@ -3953,7 +3962,7 @@
           <a:p>
             <a:r>
               <a:rPr lang="en-US" dirty="0"/>
-              <a:t>Directions for Future Development</a:t>
+              <a:t>Demo</a:t>
             </a:r>
           </a:p>
         </p:txBody>
@@ -3963,7 +3972,7 @@
           <p:cNvPr id="3" name="Content Placeholder 2">
             <a:extLst>
               <a:ext uri="{FF2B5EF4-FFF2-40B4-BE49-F238E27FC236}">
-                <a16:creationId xmlns:a16="http://schemas.microsoft.com/office/drawing/2014/main" id="{7C250213-830B-6849-9079-0755CCDF16DA}"/>
+                <a16:creationId xmlns:a16="http://schemas.microsoft.com/office/drawing/2014/main" id="{A6BF465F-C290-DF40-A267-E45C6A9EAC84}"/>
               </a:ext>
             </a:extLst>
           </p:cNvPr>
@@ -3981,25 +3990,7 @@
           <a:p>
             <a:r>
               <a:rPr lang="en-US" dirty="0"/>
-              <a:t>Have user to create questions</a:t>
-            </a:r>
-          </a:p>
-          <a:p>
-            <a:r>
-              <a:rPr lang="en-US" dirty="0"/>
-              <a:t>Expand answer variety</a:t>
-            </a:r>
-          </a:p>
-          <a:p>
-            <a:r>
-              <a:rPr lang="en-US" dirty="0"/>
-              <a:t>Create a game to guess who is the developer based on the answers provided</a:t>
-            </a:r>
-          </a:p>
-          <a:p>
-            <a:r>
-              <a:rPr lang="en-US" dirty="0"/>
-              <a:t>Track score</a:t>
+              <a:t>Demo video here</a:t>
             </a:r>
           </a:p>
         </p:txBody>
@@ -4007,7 +3998,7 @@
     </p:spTree>
     <p:extLst>
       <p:ext uri="{BB962C8B-B14F-4D97-AF65-F5344CB8AC3E}">
-        <p14:creationId xmlns:p14="http://schemas.microsoft.com/office/powerpoint/2010/main" val="2183977864"/>
+        <p14:creationId xmlns:p14="http://schemas.microsoft.com/office/powerpoint/2010/main" val="3947207254"/>
       </p:ext>
     </p:extLst>
   </p:cSld>
@@ -4039,6 +4030,110 @@
           <p:cNvPr id="2" name="Title 1">
             <a:extLst>
               <a:ext uri="{FF2B5EF4-FFF2-40B4-BE49-F238E27FC236}">
+                <a16:creationId xmlns:a16="http://schemas.microsoft.com/office/drawing/2014/main" id="{8A1BF9CB-7A7D-EE42-AC8A-80C2AAD7ABBF}"/>
+              </a:ext>
+            </a:extLst>
+          </p:cNvPr>
+          <p:cNvSpPr>
+            <a:spLocks noGrp="1"/>
+          </p:cNvSpPr>
+          <p:nvPr>
+            <p:ph type="title"/>
+          </p:nvPr>
+        </p:nvSpPr>
+        <p:spPr/>
+        <p:txBody>
+          <a:bodyPr/>
+          <a:lstStyle/>
+          <a:p>
+            <a:r>
+              <a:rPr lang="en-US" dirty="0"/>
+              <a:t>Directions for Future Development</a:t>
+            </a:r>
+          </a:p>
+        </p:txBody>
+      </p:sp>
+      <p:sp>
+        <p:nvSpPr>
+          <p:cNvPr id="3" name="Content Placeholder 2">
+            <a:extLst>
+              <a:ext uri="{FF2B5EF4-FFF2-40B4-BE49-F238E27FC236}">
+                <a16:creationId xmlns:a16="http://schemas.microsoft.com/office/drawing/2014/main" id="{7C250213-830B-6849-9079-0755CCDF16DA}"/>
+              </a:ext>
+            </a:extLst>
+          </p:cNvPr>
+          <p:cNvSpPr>
+            <a:spLocks noGrp="1"/>
+          </p:cNvSpPr>
+          <p:nvPr>
+            <p:ph idx="1"/>
+          </p:nvPr>
+        </p:nvSpPr>
+        <p:spPr/>
+        <p:txBody>
+          <a:bodyPr/>
+          <a:lstStyle/>
+          <a:p>
+            <a:r>
+              <a:rPr lang="en-US" dirty="0"/>
+              <a:t>Have user to create questions</a:t>
+            </a:r>
+          </a:p>
+          <a:p>
+            <a:r>
+              <a:rPr lang="en-US" dirty="0"/>
+              <a:t>Expand answer variety</a:t>
+            </a:r>
+          </a:p>
+          <a:p>
+            <a:r>
+              <a:rPr lang="en-US" dirty="0"/>
+              <a:t>Create a game to guess who is the developer based on the answers provided</a:t>
+            </a:r>
+          </a:p>
+          <a:p>
+            <a:r>
+              <a:rPr lang="en-US" dirty="0"/>
+              <a:t>Track score</a:t>
+            </a:r>
+          </a:p>
+        </p:txBody>
+      </p:sp>
+    </p:spTree>
+    <p:extLst>
+      <p:ext uri="{BB962C8B-B14F-4D97-AF65-F5344CB8AC3E}">
+        <p14:creationId xmlns:p14="http://schemas.microsoft.com/office/powerpoint/2010/main" val="2183977864"/>
+      </p:ext>
+    </p:extLst>
+  </p:cSld>
+  <p:clrMapOvr>
+    <a:masterClrMapping/>
+  </p:clrMapOvr>
+</p:sld>
+</file>
+
+<file path=ppt/slides/slide8.xml><?xml version="1.0" encoding="utf-8"?>
+<p:sld xmlns:a="http://schemas.openxmlformats.org/drawingml/2006/main" xmlns:r="http://schemas.openxmlformats.org/officeDocument/2006/relationships" xmlns:p="http://schemas.openxmlformats.org/presentationml/2006/main">
+  <p:cSld>
+    <p:spTree>
+      <p:nvGrpSpPr>
+        <p:cNvPr id="1" name=""/>
+        <p:cNvGrpSpPr/>
+        <p:nvPr/>
+      </p:nvGrpSpPr>
+      <p:grpSpPr>
+        <a:xfrm>
+          <a:off x="0" y="0"/>
+          <a:ext cx="0" cy="0"/>
+          <a:chOff x="0" y="0"/>
+          <a:chExt cx="0" cy="0"/>
+        </a:xfrm>
+      </p:grpSpPr>
+      <p:sp>
+        <p:nvSpPr>
+          <p:cNvPr id="2" name="Title 1">
+            <a:extLst>
+              <a:ext uri="{FF2B5EF4-FFF2-40B4-BE49-F238E27FC236}">
                 <a16:creationId xmlns:a16="http://schemas.microsoft.com/office/drawing/2014/main" id="{2515D873-FA42-FF43-A5FC-02388DCB4857}"/>
               </a:ext>
             </a:extLst>
@@ -4093,8 +4188,28 @@
             <a:pPr fontAlgn="base"/>
             <a:r>
               <a:rPr lang="en-US" dirty="0"/>
-              <a:t>GitHub repo</a:t>
-            </a:r>
+              <a:t>Heroku</a:t>
+            </a:r>
+          </a:p>
+          <a:p>
+            <a:pPr fontAlgn="base"/>
+            <a:r>
+              <a:rPr lang="en-US" dirty="0"/>
+              <a:t>GitHub repo: </a:t>
+            </a:r>
+            <a:r>
+              <a:rPr lang="en-US" dirty="0">
+                <a:hlinkClick r:id="rId2"/>
+              </a:rPr>
+              <a:t>https://github.com</a:t>
+            </a:r>
+            <a:r>
+              <a:rPr lang="en-US">
+                <a:hlinkClick r:id="rId2"/>
+              </a:rPr>
+              <a:t>/aguerra1508/Project2</a:t>
+            </a:r>
+            <a:endParaRPr lang="en-US"/>
           </a:p>
         </p:txBody>
       </p:sp>

</xml_diff>